<commit_message>
Migrations: - VS 2017 to VS 2019 - .NET Framework 4.6.1 to .NET Framework 4.8 - FxCop to FxCop analyzers - packages.config to PackageReference
</commit_message>
<xml_diff>
--- a/PptPollyDemo.pptx
+++ b/PptPollyDemo.pptx
@@ -198,7 +198,7 @@
           <a:p>
             <a:fld id="{D0B69C2B-17B0-4B07-B96E-12DA44B8A827}" type="datetimeFigureOut">
               <a:rPr lang="en-US" smtClean="0"/>
-              <a:t>12/20/2018</a:t>
+              <a:t>2/4/2020</a:t>
             </a:fld>
             <a:endParaRPr lang="en-US"/>
           </a:p>
@@ -262,38 +262,37 @@
           <a:p>
             <a:pPr lvl="0"/>
             <a:r>
-              <a:rPr lang="en-US" smtClean="0"/>
+              <a:rPr lang="en-US"/>
               <a:t>Edit Master text styles</a:t>
             </a:r>
           </a:p>
           <a:p>
             <a:pPr lvl="1"/>
             <a:r>
-              <a:rPr lang="en-US" smtClean="0"/>
+              <a:rPr lang="en-US"/>
               <a:t>Second level</a:t>
             </a:r>
           </a:p>
           <a:p>
             <a:pPr lvl="2"/>
             <a:r>
-              <a:rPr lang="en-US" smtClean="0"/>
+              <a:rPr lang="en-US"/>
               <a:t>Third level</a:t>
             </a:r>
           </a:p>
           <a:p>
             <a:pPr lvl="3"/>
             <a:r>
-              <a:rPr lang="en-US" smtClean="0"/>
+              <a:rPr lang="en-US"/>
               <a:t>Fourth level</a:t>
             </a:r>
           </a:p>
           <a:p>
             <a:pPr lvl="4"/>
             <a:r>
-              <a:rPr lang="en-US" smtClean="0"/>
+              <a:rPr lang="en-US"/>
               <a:t>Fifth level</a:t>
             </a:r>
-            <a:endParaRPr lang="en-US"/>
           </a:p>
         </p:txBody>
       </p:sp>
@@ -511,13 +510,13 @@
           <a:lstStyle/>
           <a:p>
             <a:r>
-              <a:rPr lang="en-US" dirty="0" smtClean="0"/>
+              <a:rPr lang="en-US" dirty="0"/>
               <a:t>This is an example of text to be converted to speech</a:t>
             </a:r>
           </a:p>
           <a:p>
             <a:r>
-              <a:rPr lang="en-US" sz="1200" b="0" i="0" kern="1200" dirty="0" smtClean="0">
+              <a:rPr lang="en-US" sz="1200" b="0" i="0" kern="1200" dirty="0">
                 <a:solidFill>
                   <a:schemeClr val="tx1"/>
                 </a:solidFill>
@@ -610,10 +609,9 @@
           </a:lstStyle>
           <a:p>
             <a:r>
-              <a:rPr lang="en-US" smtClean="0"/>
+              <a:rPr lang="en-US"/>
               <a:t>Click to edit Master title style</a:t>
             </a:r>
-            <a:endParaRPr lang="en-US"/>
           </a:p>
         </p:txBody>
       </p:sp>
@@ -675,10 +673,9 @@
           </a:lstStyle>
           <a:p>
             <a:r>
-              <a:rPr lang="en-US" smtClean="0"/>
+              <a:rPr lang="en-US"/>
               <a:t>Click to edit Master subtitle style</a:t>
             </a:r>
-            <a:endParaRPr lang="en-US"/>
           </a:p>
         </p:txBody>
       </p:sp>
@@ -699,7 +696,7 @@
           <a:p>
             <a:fld id="{C65D48FF-2794-4913-A43E-931D36D1345F}" type="datetimeFigureOut">
               <a:rPr lang="en-US" smtClean="0"/>
-              <a:t>12/20/2018</a:t>
+              <a:t>2/4/2020</a:t>
             </a:fld>
             <a:endParaRPr lang="en-US"/>
           </a:p>
@@ -793,10 +790,9 @@
           <a:lstStyle/>
           <a:p>
             <a:r>
-              <a:rPr lang="en-US" smtClean="0"/>
+              <a:rPr lang="en-US"/>
               <a:t>Click to edit Master title style</a:t>
             </a:r>
-            <a:endParaRPr lang="en-US"/>
           </a:p>
         </p:txBody>
       </p:sp>
@@ -817,38 +813,37 @@
           <a:p>
             <a:pPr lvl="0"/>
             <a:r>
-              <a:rPr lang="en-US" smtClean="0"/>
+              <a:rPr lang="en-US"/>
               <a:t>Edit Master text styles</a:t>
             </a:r>
           </a:p>
           <a:p>
             <a:pPr lvl="1"/>
             <a:r>
-              <a:rPr lang="en-US" smtClean="0"/>
+              <a:rPr lang="en-US"/>
               <a:t>Second level</a:t>
             </a:r>
           </a:p>
           <a:p>
             <a:pPr lvl="2"/>
             <a:r>
-              <a:rPr lang="en-US" smtClean="0"/>
+              <a:rPr lang="en-US"/>
               <a:t>Third level</a:t>
             </a:r>
           </a:p>
           <a:p>
             <a:pPr lvl="3"/>
             <a:r>
-              <a:rPr lang="en-US" smtClean="0"/>
+              <a:rPr lang="en-US"/>
               <a:t>Fourth level</a:t>
             </a:r>
           </a:p>
           <a:p>
             <a:pPr lvl="4"/>
             <a:r>
-              <a:rPr lang="en-US" smtClean="0"/>
+              <a:rPr lang="en-US"/>
               <a:t>Fifth level</a:t>
             </a:r>
-            <a:endParaRPr lang="en-US"/>
           </a:p>
         </p:txBody>
       </p:sp>
@@ -869,7 +864,7 @@
           <a:p>
             <a:fld id="{C65D48FF-2794-4913-A43E-931D36D1345F}" type="datetimeFigureOut">
               <a:rPr lang="en-US" smtClean="0"/>
-              <a:t>12/20/2018</a:t>
+              <a:t>2/4/2020</a:t>
             </a:fld>
             <a:endParaRPr lang="en-US"/>
           </a:p>
@@ -968,10 +963,9 @@
           <a:lstStyle/>
           <a:p>
             <a:r>
-              <a:rPr lang="en-US" smtClean="0"/>
+              <a:rPr lang="en-US"/>
               <a:t>Click to edit Master title style</a:t>
             </a:r>
-            <a:endParaRPr lang="en-US"/>
           </a:p>
         </p:txBody>
       </p:sp>
@@ -997,38 +991,37 @@
           <a:p>
             <a:pPr lvl="0"/>
             <a:r>
-              <a:rPr lang="en-US" smtClean="0"/>
+              <a:rPr lang="en-US"/>
               <a:t>Edit Master text styles</a:t>
             </a:r>
           </a:p>
           <a:p>
             <a:pPr lvl="1"/>
             <a:r>
-              <a:rPr lang="en-US" smtClean="0"/>
+              <a:rPr lang="en-US"/>
               <a:t>Second level</a:t>
             </a:r>
           </a:p>
           <a:p>
             <a:pPr lvl="2"/>
             <a:r>
-              <a:rPr lang="en-US" smtClean="0"/>
+              <a:rPr lang="en-US"/>
               <a:t>Third level</a:t>
             </a:r>
           </a:p>
           <a:p>
             <a:pPr lvl="3"/>
             <a:r>
-              <a:rPr lang="en-US" smtClean="0"/>
+              <a:rPr lang="en-US"/>
               <a:t>Fourth level</a:t>
             </a:r>
           </a:p>
           <a:p>
             <a:pPr lvl="4"/>
             <a:r>
-              <a:rPr lang="en-US" smtClean="0"/>
+              <a:rPr lang="en-US"/>
               <a:t>Fifth level</a:t>
             </a:r>
-            <a:endParaRPr lang="en-US"/>
           </a:p>
         </p:txBody>
       </p:sp>
@@ -1049,7 +1042,7 @@
           <a:p>
             <a:fld id="{C65D48FF-2794-4913-A43E-931D36D1345F}" type="datetimeFigureOut">
               <a:rPr lang="en-US" smtClean="0"/>
-              <a:t>12/20/2018</a:t>
+              <a:t>2/4/2020</a:t>
             </a:fld>
             <a:endParaRPr lang="en-US"/>
           </a:p>
@@ -1143,10 +1136,9 @@
           <a:lstStyle/>
           <a:p>
             <a:r>
-              <a:rPr lang="en-US" smtClean="0"/>
+              <a:rPr lang="en-US"/>
               <a:t>Click to edit Master title style</a:t>
             </a:r>
-            <a:endParaRPr lang="en-US"/>
           </a:p>
         </p:txBody>
       </p:sp>
@@ -1167,38 +1159,37 @@
           <a:p>
             <a:pPr lvl="0"/>
             <a:r>
-              <a:rPr lang="en-US" smtClean="0"/>
+              <a:rPr lang="en-US"/>
               <a:t>Edit Master text styles</a:t>
             </a:r>
           </a:p>
           <a:p>
             <a:pPr lvl="1"/>
             <a:r>
-              <a:rPr lang="en-US" smtClean="0"/>
+              <a:rPr lang="en-US"/>
               <a:t>Second level</a:t>
             </a:r>
           </a:p>
           <a:p>
             <a:pPr lvl="2"/>
             <a:r>
-              <a:rPr lang="en-US" smtClean="0"/>
+              <a:rPr lang="en-US"/>
               <a:t>Third level</a:t>
             </a:r>
           </a:p>
           <a:p>
             <a:pPr lvl="3"/>
             <a:r>
-              <a:rPr lang="en-US" smtClean="0"/>
+              <a:rPr lang="en-US"/>
               <a:t>Fourth level</a:t>
             </a:r>
           </a:p>
           <a:p>
             <a:pPr lvl="4"/>
             <a:r>
-              <a:rPr lang="en-US" smtClean="0"/>
+              <a:rPr lang="en-US"/>
               <a:t>Fifth level</a:t>
             </a:r>
-            <a:endParaRPr lang="en-US"/>
           </a:p>
         </p:txBody>
       </p:sp>
@@ -1219,7 +1210,7 @@
           <a:p>
             <a:fld id="{C65D48FF-2794-4913-A43E-931D36D1345F}" type="datetimeFigureOut">
               <a:rPr lang="en-US" smtClean="0"/>
-              <a:t>12/20/2018</a:t>
+              <a:t>2/4/2020</a:t>
             </a:fld>
             <a:endParaRPr lang="en-US"/>
           </a:p>
@@ -1322,10 +1313,9 @@
           </a:lstStyle>
           <a:p>
             <a:r>
-              <a:rPr lang="en-US" smtClean="0"/>
+              <a:rPr lang="en-US"/>
               <a:t>Click to edit Master title style</a:t>
             </a:r>
-            <a:endParaRPr lang="en-US"/>
           </a:p>
         </p:txBody>
       </p:sp>
@@ -1442,7 +1432,7 @@
           <a:p>
             <a:pPr lvl="0"/>
             <a:r>
-              <a:rPr lang="en-US" smtClean="0"/>
+              <a:rPr lang="en-US"/>
               <a:t>Edit Master text styles</a:t>
             </a:r>
           </a:p>
@@ -1465,7 +1455,7 @@
           <a:p>
             <a:fld id="{C65D48FF-2794-4913-A43E-931D36D1345F}" type="datetimeFigureOut">
               <a:rPr lang="en-US" smtClean="0"/>
-              <a:t>12/20/2018</a:t>
+              <a:t>2/4/2020</a:t>
             </a:fld>
             <a:endParaRPr lang="en-US"/>
           </a:p>
@@ -1559,10 +1549,9 @@
           <a:lstStyle/>
           <a:p>
             <a:r>
-              <a:rPr lang="en-US" smtClean="0"/>
+              <a:rPr lang="en-US"/>
               <a:t>Click to edit Master title style</a:t>
             </a:r>
-            <a:endParaRPr lang="en-US"/>
           </a:p>
         </p:txBody>
       </p:sp>
@@ -1588,38 +1577,37 @@
           <a:p>
             <a:pPr lvl="0"/>
             <a:r>
-              <a:rPr lang="en-US" smtClean="0"/>
+              <a:rPr lang="en-US"/>
               <a:t>Edit Master text styles</a:t>
             </a:r>
           </a:p>
           <a:p>
             <a:pPr lvl="1"/>
             <a:r>
-              <a:rPr lang="en-US" smtClean="0"/>
+              <a:rPr lang="en-US"/>
               <a:t>Second level</a:t>
             </a:r>
           </a:p>
           <a:p>
             <a:pPr lvl="2"/>
             <a:r>
-              <a:rPr lang="en-US" smtClean="0"/>
+              <a:rPr lang="en-US"/>
               <a:t>Third level</a:t>
             </a:r>
           </a:p>
           <a:p>
             <a:pPr lvl="3"/>
             <a:r>
-              <a:rPr lang="en-US" smtClean="0"/>
+              <a:rPr lang="en-US"/>
               <a:t>Fourth level</a:t>
             </a:r>
           </a:p>
           <a:p>
             <a:pPr lvl="4"/>
             <a:r>
-              <a:rPr lang="en-US" smtClean="0"/>
+              <a:rPr lang="en-US"/>
               <a:t>Fifth level</a:t>
             </a:r>
-            <a:endParaRPr lang="en-US"/>
           </a:p>
         </p:txBody>
       </p:sp>
@@ -1645,38 +1633,37 @@
           <a:p>
             <a:pPr lvl="0"/>
             <a:r>
-              <a:rPr lang="en-US" smtClean="0"/>
+              <a:rPr lang="en-US"/>
               <a:t>Edit Master text styles</a:t>
             </a:r>
           </a:p>
           <a:p>
             <a:pPr lvl="1"/>
             <a:r>
-              <a:rPr lang="en-US" smtClean="0"/>
+              <a:rPr lang="en-US"/>
               <a:t>Second level</a:t>
             </a:r>
           </a:p>
           <a:p>
             <a:pPr lvl="2"/>
             <a:r>
-              <a:rPr lang="en-US" smtClean="0"/>
+              <a:rPr lang="en-US"/>
               <a:t>Third level</a:t>
             </a:r>
           </a:p>
           <a:p>
             <a:pPr lvl="3"/>
             <a:r>
-              <a:rPr lang="en-US" smtClean="0"/>
+              <a:rPr lang="en-US"/>
               <a:t>Fourth level</a:t>
             </a:r>
           </a:p>
           <a:p>
             <a:pPr lvl="4"/>
             <a:r>
-              <a:rPr lang="en-US" smtClean="0"/>
+              <a:rPr lang="en-US"/>
               <a:t>Fifth level</a:t>
             </a:r>
-            <a:endParaRPr lang="en-US"/>
           </a:p>
         </p:txBody>
       </p:sp>
@@ -1697,7 +1684,7 @@
           <a:p>
             <a:fld id="{C65D48FF-2794-4913-A43E-931D36D1345F}" type="datetimeFigureOut">
               <a:rPr lang="en-US" smtClean="0"/>
-              <a:t>12/20/2018</a:t>
+              <a:t>2/4/2020</a:t>
             </a:fld>
             <a:endParaRPr lang="en-US"/>
           </a:p>
@@ -1796,10 +1783,9 @@
           <a:lstStyle/>
           <a:p>
             <a:r>
-              <a:rPr lang="en-US" smtClean="0"/>
+              <a:rPr lang="en-US"/>
               <a:t>Click to edit Master title style</a:t>
             </a:r>
-            <a:endParaRPr lang="en-US"/>
           </a:p>
         </p:txBody>
       </p:sp>
@@ -1862,7 +1848,7 @@
           <a:p>
             <a:pPr lvl="0"/>
             <a:r>
-              <a:rPr lang="en-US" smtClean="0"/>
+              <a:rPr lang="en-US"/>
               <a:t>Edit Master text styles</a:t>
             </a:r>
           </a:p>
@@ -1890,38 +1876,37 @@
           <a:p>
             <a:pPr lvl="0"/>
             <a:r>
-              <a:rPr lang="en-US" smtClean="0"/>
+              <a:rPr lang="en-US"/>
               <a:t>Edit Master text styles</a:t>
             </a:r>
           </a:p>
           <a:p>
             <a:pPr lvl="1"/>
             <a:r>
-              <a:rPr lang="en-US" smtClean="0"/>
+              <a:rPr lang="en-US"/>
               <a:t>Second level</a:t>
             </a:r>
           </a:p>
           <a:p>
             <a:pPr lvl="2"/>
             <a:r>
-              <a:rPr lang="en-US" smtClean="0"/>
+              <a:rPr lang="en-US"/>
               <a:t>Third level</a:t>
             </a:r>
           </a:p>
           <a:p>
             <a:pPr lvl="3"/>
             <a:r>
-              <a:rPr lang="en-US" smtClean="0"/>
+              <a:rPr lang="en-US"/>
               <a:t>Fourth level</a:t>
             </a:r>
           </a:p>
           <a:p>
             <a:pPr lvl="4"/>
             <a:r>
-              <a:rPr lang="en-US" smtClean="0"/>
+              <a:rPr lang="en-US"/>
               <a:t>Fifth level</a:t>
             </a:r>
-            <a:endParaRPr lang="en-US"/>
           </a:p>
         </p:txBody>
       </p:sp>
@@ -1984,7 +1969,7 @@
           <a:p>
             <a:pPr lvl="0"/>
             <a:r>
-              <a:rPr lang="en-US" smtClean="0"/>
+              <a:rPr lang="en-US"/>
               <a:t>Edit Master text styles</a:t>
             </a:r>
           </a:p>
@@ -2012,38 +1997,37 @@
           <a:p>
             <a:pPr lvl="0"/>
             <a:r>
-              <a:rPr lang="en-US" smtClean="0"/>
+              <a:rPr lang="en-US"/>
               <a:t>Edit Master text styles</a:t>
             </a:r>
           </a:p>
           <a:p>
             <a:pPr lvl="1"/>
             <a:r>
-              <a:rPr lang="en-US" smtClean="0"/>
+              <a:rPr lang="en-US"/>
               <a:t>Second level</a:t>
             </a:r>
           </a:p>
           <a:p>
             <a:pPr lvl="2"/>
             <a:r>
-              <a:rPr lang="en-US" smtClean="0"/>
+              <a:rPr lang="en-US"/>
               <a:t>Third level</a:t>
             </a:r>
           </a:p>
           <a:p>
             <a:pPr lvl="3"/>
             <a:r>
-              <a:rPr lang="en-US" smtClean="0"/>
+              <a:rPr lang="en-US"/>
               <a:t>Fourth level</a:t>
             </a:r>
           </a:p>
           <a:p>
             <a:pPr lvl="4"/>
             <a:r>
-              <a:rPr lang="en-US" smtClean="0"/>
+              <a:rPr lang="en-US"/>
               <a:t>Fifth level</a:t>
             </a:r>
-            <a:endParaRPr lang="en-US"/>
           </a:p>
         </p:txBody>
       </p:sp>
@@ -2064,7 +2048,7 @@
           <a:p>
             <a:fld id="{C65D48FF-2794-4913-A43E-931D36D1345F}" type="datetimeFigureOut">
               <a:rPr lang="en-US" smtClean="0"/>
-              <a:t>12/20/2018</a:t>
+              <a:t>2/4/2020</a:t>
             </a:fld>
             <a:endParaRPr lang="en-US"/>
           </a:p>
@@ -2158,10 +2142,9 @@
           <a:lstStyle/>
           <a:p>
             <a:r>
-              <a:rPr lang="en-US" smtClean="0"/>
+              <a:rPr lang="en-US"/>
               <a:t>Click to edit Master title style</a:t>
             </a:r>
-            <a:endParaRPr lang="en-US"/>
           </a:p>
         </p:txBody>
       </p:sp>
@@ -2182,7 +2165,7 @@
           <a:p>
             <a:fld id="{C65D48FF-2794-4913-A43E-931D36D1345F}" type="datetimeFigureOut">
               <a:rPr lang="en-US" smtClean="0"/>
-              <a:t>12/20/2018</a:t>
+              <a:t>2/4/2020</a:t>
             </a:fld>
             <a:endParaRPr lang="en-US"/>
           </a:p>
@@ -2277,7 +2260,7 @@
           <a:p>
             <a:fld id="{C65D48FF-2794-4913-A43E-931D36D1345F}" type="datetimeFigureOut">
               <a:rPr lang="en-US" smtClean="0"/>
-              <a:t>12/20/2018</a:t>
+              <a:t>2/4/2020</a:t>
             </a:fld>
             <a:endParaRPr lang="en-US"/>
           </a:p>
@@ -2380,10 +2363,9 @@
           </a:lstStyle>
           <a:p>
             <a:r>
-              <a:rPr lang="en-US" smtClean="0"/>
+              <a:rPr lang="en-US"/>
               <a:t>Click to edit Master title style</a:t>
             </a:r>
-            <a:endParaRPr lang="en-US"/>
           </a:p>
         </p:txBody>
       </p:sp>
@@ -2437,38 +2419,37 @@
           <a:p>
             <a:pPr lvl="0"/>
             <a:r>
-              <a:rPr lang="en-US" smtClean="0"/>
+              <a:rPr lang="en-US"/>
               <a:t>Edit Master text styles</a:t>
             </a:r>
           </a:p>
           <a:p>
             <a:pPr lvl="1"/>
             <a:r>
-              <a:rPr lang="en-US" smtClean="0"/>
+              <a:rPr lang="en-US"/>
               <a:t>Second level</a:t>
             </a:r>
           </a:p>
           <a:p>
             <a:pPr lvl="2"/>
             <a:r>
-              <a:rPr lang="en-US" smtClean="0"/>
+              <a:rPr lang="en-US"/>
               <a:t>Third level</a:t>
             </a:r>
           </a:p>
           <a:p>
             <a:pPr lvl="3"/>
             <a:r>
-              <a:rPr lang="en-US" smtClean="0"/>
+              <a:rPr lang="en-US"/>
               <a:t>Fourth level</a:t>
             </a:r>
           </a:p>
           <a:p>
             <a:pPr lvl="4"/>
             <a:r>
-              <a:rPr lang="en-US" smtClean="0"/>
+              <a:rPr lang="en-US"/>
               <a:t>Fifth level</a:t>
             </a:r>
-            <a:endParaRPr lang="en-US"/>
           </a:p>
         </p:txBody>
       </p:sp>
@@ -2531,7 +2512,7 @@
           <a:p>
             <a:pPr lvl="0"/>
             <a:r>
-              <a:rPr lang="en-US" smtClean="0"/>
+              <a:rPr lang="en-US"/>
               <a:t>Edit Master text styles</a:t>
             </a:r>
           </a:p>
@@ -2554,7 +2535,7 @@
           <a:p>
             <a:fld id="{C65D48FF-2794-4913-A43E-931D36D1345F}" type="datetimeFigureOut">
               <a:rPr lang="en-US" smtClean="0"/>
-              <a:t>12/20/2018</a:t>
+              <a:t>2/4/2020</a:t>
             </a:fld>
             <a:endParaRPr lang="en-US"/>
           </a:p>
@@ -2657,10 +2638,9 @@
           </a:lstStyle>
           <a:p>
             <a:r>
-              <a:rPr lang="en-US" smtClean="0"/>
+              <a:rPr lang="en-US"/>
               <a:t>Click to edit Master title style</a:t>
             </a:r>
-            <a:endParaRPr lang="en-US"/>
           </a:p>
         </p:txBody>
       </p:sp>
@@ -2784,7 +2764,7 @@
           <a:p>
             <a:pPr lvl="0"/>
             <a:r>
-              <a:rPr lang="en-US" smtClean="0"/>
+              <a:rPr lang="en-US"/>
               <a:t>Edit Master text styles</a:t>
             </a:r>
           </a:p>
@@ -2807,7 +2787,7 @@
           <a:p>
             <a:fld id="{C65D48FF-2794-4913-A43E-931D36D1345F}" type="datetimeFigureOut">
               <a:rPr lang="en-US" smtClean="0"/>
-              <a:t>12/20/2018</a:t>
+              <a:t>2/4/2020</a:t>
             </a:fld>
             <a:endParaRPr lang="en-US"/>
           </a:p>
@@ -2916,10 +2896,9 @@
           <a:lstStyle/>
           <a:p>
             <a:r>
-              <a:rPr lang="en-US" smtClean="0"/>
+              <a:rPr lang="en-US"/>
               <a:t>Click to edit Master title style</a:t>
             </a:r>
-            <a:endParaRPr lang="en-US"/>
           </a:p>
         </p:txBody>
       </p:sp>
@@ -2950,38 +2929,37 @@
           <a:p>
             <a:pPr lvl="0"/>
             <a:r>
-              <a:rPr lang="en-US" smtClean="0"/>
+              <a:rPr lang="en-US"/>
               <a:t>Edit Master text styles</a:t>
             </a:r>
           </a:p>
           <a:p>
             <a:pPr lvl="1"/>
             <a:r>
-              <a:rPr lang="en-US" smtClean="0"/>
+              <a:rPr lang="en-US"/>
               <a:t>Second level</a:t>
             </a:r>
           </a:p>
           <a:p>
             <a:pPr lvl="2"/>
             <a:r>
-              <a:rPr lang="en-US" smtClean="0"/>
+              <a:rPr lang="en-US"/>
               <a:t>Third level</a:t>
             </a:r>
           </a:p>
           <a:p>
             <a:pPr lvl="3"/>
             <a:r>
-              <a:rPr lang="en-US" smtClean="0"/>
+              <a:rPr lang="en-US"/>
               <a:t>Fourth level</a:t>
             </a:r>
           </a:p>
           <a:p>
             <a:pPr lvl="4"/>
             <a:r>
-              <a:rPr lang="en-US" smtClean="0"/>
+              <a:rPr lang="en-US"/>
               <a:t>Fifth level</a:t>
             </a:r>
-            <a:endParaRPr lang="en-US"/>
           </a:p>
         </p:txBody>
       </p:sp>
@@ -3020,7 +2998,7 @@
           <a:p>
             <a:fld id="{C65D48FF-2794-4913-A43E-931D36D1345F}" type="datetimeFigureOut">
               <a:rPr lang="en-US" smtClean="0"/>
-              <a:t>12/20/2018</a:t>
+              <a:t>2/4/2020</a:t>
             </a:fld>
             <a:endParaRPr lang="en-US"/>
           </a:p>
@@ -3441,14 +3419,13 @@
           <a:lstStyle/>
           <a:p>
             <a:r>
-              <a:rPr lang="en-US" dirty="0" err="1" smtClean="0"/>
+              <a:rPr lang="en-US" dirty="0" err="1"/>
               <a:t>PptPolly</a:t>
             </a:r>
             <a:r>
-              <a:rPr lang="en-US" dirty="0" smtClean="0"/>
+              <a:rPr lang="en-US" dirty="0"/>
               <a:t> Demo</a:t>
             </a:r>
-            <a:endParaRPr lang="en-US" dirty="0"/>
           </a:p>
         </p:txBody>
       </p:sp>
@@ -3468,16 +3445,15 @@
           <a:lstStyle/>
           <a:p>
             <a:r>
-              <a:rPr lang="en-US" dirty="0" smtClean="0"/>
+              <a:rPr lang="en-US" dirty="0"/>
               <a:t>Alisson Sol</a:t>
             </a:r>
           </a:p>
           <a:p>
             <a:r>
-              <a:rPr lang="en-US" dirty="0" smtClean="0"/>
-              <a:t>2018</a:t>
-            </a:r>
-            <a:endParaRPr lang="en-US" dirty="0"/>
+              <a:rPr lang="en-US" dirty="0"/>
+              <a:t>2018-2020</a:t>
+            </a:r>
           </a:p>
         </p:txBody>
       </p:sp>
@@ -3527,10 +3503,9 @@
           <a:lstStyle/>
           <a:p>
             <a:r>
-              <a:rPr lang="en-US" dirty="0" smtClean="0"/>
+              <a:rPr lang="en-US" dirty="0"/>
               <a:t>For slides in which you need speech</a:t>
             </a:r>
-            <a:endParaRPr lang="en-US" dirty="0"/>
           </a:p>
         </p:txBody>
       </p:sp>
@@ -3550,66 +3525,65 @@
           <a:lstStyle/>
           <a:p>
             <a:r>
-              <a:rPr lang="en-US" dirty="0" smtClean="0"/>
+              <a:rPr lang="en-US" dirty="0"/>
               <a:t>Add notes with just 2 lines:</a:t>
             </a:r>
           </a:p>
           <a:p>
             <a:pPr lvl="1"/>
             <a:r>
-              <a:rPr lang="en-US" dirty="0" smtClean="0"/>
+              <a:rPr lang="en-US" dirty="0"/>
               <a:t>Speech: string with text to become speech</a:t>
             </a:r>
           </a:p>
           <a:p>
             <a:pPr lvl="1"/>
             <a:r>
-              <a:rPr lang="en-US" dirty="0" smtClean="0"/>
+              <a:rPr lang="en-US" dirty="0"/>
               <a:t>Voice: voice name</a:t>
             </a:r>
           </a:p>
           <a:p>
             <a:pPr lvl="2"/>
             <a:r>
-              <a:rPr lang="en-US" dirty="0" smtClean="0"/>
+              <a:rPr lang="en-US" dirty="0"/>
               <a:t>List at </a:t>
             </a:r>
             <a:r>
-              <a:rPr lang="en-US" dirty="0" smtClean="0">
+              <a:rPr lang="en-US" dirty="0">
                 <a:hlinkClick r:id="rId3"/>
               </a:rPr>
               <a:t>https://docs.aws.amazon.com/polly/latest/dg/voicelist.html</a:t>
             </a:r>
-            <a:endParaRPr lang="en-US" dirty="0" smtClean="0"/>
+            <a:endParaRPr lang="en-US" dirty="0"/>
           </a:p>
           <a:p>
             <a:pPr lvl="2"/>
             <a:r>
-              <a:rPr lang="en-US" dirty="0" smtClean="0"/>
+              <a:rPr lang="en-US" dirty="0"/>
               <a:t>For now, only English voices supported. Change code for other voices.</a:t>
             </a:r>
           </a:p>
           <a:p>
             <a:pPr lvl="2"/>
-            <a:endParaRPr lang="en-US" dirty="0" smtClean="0"/>
+            <a:endParaRPr lang="en-US" dirty="0"/>
           </a:p>
           <a:p>
             <a:pPr lvl="2"/>
-            <a:endParaRPr lang="en-US" dirty="0" smtClean="0"/>
-          </a:p>
-          <a:p>
-            <a:r>
-              <a:rPr lang="en-US" dirty="0" smtClean="0"/>
+            <a:endParaRPr lang="en-US" dirty="0"/>
+          </a:p>
+          <a:p>
+            <a:r>
+              <a:rPr lang="en-US" dirty="0"/>
               <a:t>If you add a textbox to the slide title “Caption”, text will be set</a:t>
             </a:r>
           </a:p>
           <a:p>
             <a:pPr lvl="1"/>
             <a:r>
-              <a:rPr lang="en-US" dirty="0" smtClean="0"/>
+              <a:rPr lang="en-US" dirty="0"/>
               <a:t>Shape Options &gt; Size &amp; Properties &gt; Alt Text &gt; Title</a:t>
             </a:r>
-            <a:endParaRPr lang="en-US" dirty="0"/>
           </a:p>
         </p:txBody>
       </p:sp>
@@ -3639,7 +3613,7 @@
           <a:p>
             <a:pPr algn="ctr"/>
             <a:r>
-              <a:rPr lang="en-US" smtClean="0"/>
+              <a:rPr lang="en-US"/>
               <a:t>Caption</a:t>
             </a:r>
             <a:endParaRPr lang="en-US" dirty="0"/>
@@ -3656,13 +3630,6 @@
   <p:clrMapOvr>
     <a:masterClrMapping/>
   </p:clrMapOvr>
-  <p:timing>
-    <p:tnLst>
-      <p:par>
-        <p:cTn id="1" dur="indefinite" restart="never" nodeType="tmRoot"/>
-      </p:par>
-    </p:tnLst>
-  </p:timing>
 </p:sld>
 </file>
 

</xml_diff>